<commit_message>
edits part 1 111221
</commit_message>
<xml_diff>
--- a/docs/images/cisco-meraki-sd-wan-vmx-architecture-diagram.pptx
+++ b/docs/images/cisco-meraki-sd-wan-vmx-architecture-diagram.pptx
@@ -258,7 +258,7 @@
           <a:p>
             <a:fld id="{66A1C720-F646-4663-BA47-18BA1F80B731}" type="datetimeFigureOut">
               <a:rPr lang="en-US" smtClean="0"/>
-              <a:t>11/8/2021</a:t>
+              <a:t>11/9/2021</a:t>
             </a:fld>
             <a:endParaRPr lang="en-US"/>
           </a:p>
@@ -428,7 +428,7 @@
           <a:p>
             <a:fld id="{66A1C720-F646-4663-BA47-18BA1F80B731}" type="datetimeFigureOut">
               <a:rPr lang="en-US" smtClean="0"/>
-              <a:t>11/8/2021</a:t>
+              <a:t>11/9/2021</a:t>
             </a:fld>
             <a:endParaRPr lang="en-US"/>
           </a:p>
@@ -608,7 +608,7 @@
           <a:p>
             <a:fld id="{66A1C720-F646-4663-BA47-18BA1F80B731}" type="datetimeFigureOut">
               <a:rPr lang="en-US" smtClean="0"/>
-              <a:t>11/8/2021</a:t>
+              <a:t>11/9/2021</a:t>
             </a:fld>
             <a:endParaRPr lang="en-US"/>
           </a:p>
@@ -778,7 +778,7 @@
           <a:p>
             <a:fld id="{66A1C720-F646-4663-BA47-18BA1F80B731}" type="datetimeFigureOut">
               <a:rPr lang="en-US" smtClean="0"/>
-              <a:t>11/8/2021</a:t>
+              <a:t>11/9/2021</a:t>
             </a:fld>
             <a:endParaRPr lang="en-US"/>
           </a:p>
@@ -1022,7 +1022,7 @@
           <a:p>
             <a:fld id="{66A1C720-F646-4663-BA47-18BA1F80B731}" type="datetimeFigureOut">
               <a:rPr lang="en-US" smtClean="0"/>
-              <a:t>11/8/2021</a:t>
+              <a:t>11/9/2021</a:t>
             </a:fld>
             <a:endParaRPr lang="en-US"/>
           </a:p>
@@ -1254,7 +1254,7 @@
           <a:p>
             <a:fld id="{66A1C720-F646-4663-BA47-18BA1F80B731}" type="datetimeFigureOut">
               <a:rPr lang="en-US" smtClean="0"/>
-              <a:t>11/8/2021</a:t>
+              <a:t>11/9/2021</a:t>
             </a:fld>
             <a:endParaRPr lang="en-US"/>
           </a:p>
@@ -1621,7 +1621,7 @@
           <a:p>
             <a:fld id="{66A1C720-F646-4663-BA47-18BA1F80B731}" type="datetimeFigureOut">
               <a:rPr lang="en-US" smtClean="0"/>
-              <a:t>11/8/2021</a:t>
+              <a:t>11/9/2021</a:t>
             </a:fld>
             <a:endParaRPr lang="en-US"/>
           </a:p>
@@ -1739,7 +1739,7 @@
           <a:p>
             <a:fld id="{66A1C720-F646-4663-BA47-18BA1F80B731}" type="datetimeFigureOut">
               <a:rPr lang="en-US" smtClean="0"/>
-              <a:t>11/8/2021</a:t>
+              <a:t>11/9/2021</a:t>
             </a:fld>
             <a:endParaRPr lang="en-US"/>
           </a:p>
@@ -1834,7 +1834,7 @@
           <a:p>
             <a:fld id="{66A1C720-F646-4663-BA47-18BA1F80B731}" type="datetimeFigureOut">
               <a:rPr lang="en-US" smtClean="0"/>
-              <a:t>11/8/2021</a:t>
+              <a:t>11/9/2021</a:t>
             </a:fld>
             <a:endParaRPr lang="en-US"/>
           </a:p>
@@ -2111,7 +2111,7 @@
           <a:p>
             <a:fld id="{66A1C720-F646-4663-BA47-18BA1F80B731}" type="datetimeFigureOut">
               <a:rPr lang="en-US" smtClean="0"/>
-              <a:t>11/8/2021</a:t>
+              <a:t>11/9/2021</a:t>
             </a:fld>
             <a:endParaRPr lang="en-US"/>
           </a:p>
@@ -2368,7 +2368,7 @@
           <a:p>
             <a:fld id="{66A1C720-F646-4663-BA47-18BA1F80B731}" type="datetimeFigureOut">
               <a:rPr lang="en-US" smtClean="0"/>
-              <a:t>11/8/2021</a:t>
+              <a:t>11/9/2021</a:t>
             </a:fld>
             <a:endParaRPr lang="en-US"/>
           </a:p>
@@ -2581,7 +2581,7 @@
           <a:p>
             <a:fld id="{66A1C720-F646-4663-BA47-18BA1F80B731}" type="datetimeFigureOut">
               <a:rPr lang="en-US" smtClean="0"/>
-              <a:t>11/8/2021</a:t>
+              <a:t>11/9/2021</a:t>
             </a:fld>
             <a:endParaRPr lang="en-US"/>
           </a:p>
@@ -19714,7 +19714,7 @@
         </p:blipFill>
         <p:spPr bwMode="auto">
           <a:xfrm>
-            <a:off x="10464271" y="2639298"/>
+            <a:off x="10449886" y="3832178"/>
             <a:ext cx="762000" cy="762000"/>
           </a:xfrm>
           <a:prstGeom prst="rect">
@@ -19761,7 +19761,7 @@
         </p:nvSpPr>
         <p:spPr bwMode="auto">
           <a:xfrm>
-            <a:off x="10008372" y="3401298"/>
+            <a:off x="9993987" y="4594178"/>
             <a:ext cx="1673798" cy="276999"/>
           </a:xfrm>
           <a:prstGeom prst="rect">
@@ -19935,7 +19935,7 @@
         </p:blipFill>
         <p:spPr bwMode="auto">
           <a:xfrm>
-            <a:off x="10464271" y="3828908"/>
+            <a:off x="10449886" y="2660541"/>
             <a:ext cx="762000" cy="762000"/>
           </a:xfrm>
           <a:prstGeom prst="rect">
@@ -19982,7 +19982,7 @@
         </p:nvSpPr>
         <p:spPr bwMode="auto">
           <a:xfrm>
-            <a:off x="10246517" y="4590114"/>
+            <a:off x="10232132" y="3421747"/>
             <a:ext cx="1197509" cy="276999"/>
           </a:xfrm>
           <a:prstGeom prst="rect">
@@ -20156,7 +20156,7 @@
         </p:blipFill>
         <p:spPr bwMode="auto">
           <a:xfrm>
-            <a:off x="10464271" y="5004968"/>
+            <a:off x="10449886" y="4974319"/>
             <a:ext cx="762000" cy="762000"/>
           </a:xfrm>
           <a:prstGeom prst="rect">
@@ -20203,7 +20203,7 @@
         </p:nvSpPr>
         <p:spPr bwMode="auto">
           <a:xfrm>
-            <a:off x="9971511" y="5766968"/>
+            <a:off x="9957126" y="5736319"/>
             <a:ext cx="1747520" cy="276999"/>
           </a:xfrm>
           <a:prstGeom prst="rect">

</xml_diff>

<commit_message>
edits to deploy steps and diagram
</commit_message>
<xml_diff>
--- a/docs/images/cisco-meraki-sd-wan-vmx-architecture-diagram.pptx
+++ b/docs/images/cisco-meraki-sd-wan-vmx-architecture-diagram.pptx
@@ -3807,7 +3807,7 @@
         <p:spPr bwMode="auto">
           <a:xfrm>
             <a:off x="4612866" y="5125416"/>
-            <a:ext cx="1342852" cy="430887"/>
+            <a:ext cx="1342852" cy="461665"/>
           </a:xfrm>
           <a:prstGeom prst="rect">
             <a:avLst/>
@@ -3941,7 +3941,7 @@
           <a:p>
             <a:pPr algn="ctr" eaLnBrk="1" hangingPunct="1"/>
             <a:r>
-              <a:rPr lang="en-US" altLang="en-US" sz="1100" dirty="0">
+              <a:rPr lang="en-US" altLang="en-US" sz="1200" dirty="0">
                 <a:latin typeface="Arial" panose="020B0604020202020204" pitchFamily="34" charset="0"/>
                 <a:ea typeface="Amazon Ember" panose="020B0603020204020204" pitchFamily="34" charset="0"/>
                 <a:cs typeface="Arial" panose="020B0604020202020204" pitchFamily="34" charset="0"/>
@@ -9367,7 +9367,7 @@
         <p:spPr bwMode="auto">
           <a:xfrm>
             <a:off x="7884631" y="5125416"/>
-            <a:ext cx="1342852" cy="430887"/>
+            <a:ext cx="1342852" cy="461665"/>
           </a:xfrm>
           <a:prstGeom prst="rect">
             <a:avLst/>
@@ -9501,7 +9501,7 @@
           <a:p>
             <a:pPr algn="ctr" eaLnBrk="1" hangingPunct="1"/>
             <a:r>
-              <a:rPr lang="en-US" altLang="en-US" sz="1100" dirty="0">
+              <a:rPr lang="en-US" altLang="en-US" sz="1200" dirty="0">
                 <a:latin typeface="Arial" panose="020B0604020202020204" pitchFamily="34" charset="0"/>
                 <a:ea typeface="Amazon Ember" panose="020B0603020204020204" pitchFamily="34" charset="0"/>
                 <a:cs typeface="Arial" panose="020B0604020202020204" pitchFamily="34" charset="0"/>

</xml_diff>